<commit_message>
Added signals (i.c.) to BP_RC. Added file with questions
</commit_message>
<xml_diff>
--- a/0_Docs_dir/3_General/Отчёт руководителям.pptx
+++ b/0_Docs_dir/3_General/Отчёт руководителям.pptx
@@ -220,7 +220,7 @@
           <a:p>
             <a:fld id="{E08BA5C7-0DF6-4BB3-8D80-C09E800CF8CB}" type="datetimeFigureOut">
               <a:rPr lang="ru-RU" smtClean="0"/>
-              <a:t>23.10.2020</a:t>
+              <a:t>01.11.2020</a:t>
             </a:fld>
             <a:endParaRPr lang="ru-RU"/>
           </a:p>
@@ -1213,7 +1213,7 @@
           <a:p>
             <a:fld id="{817AFE9C-9D88-408D-88B4-E7A081487440}" type="datetimeFigureOut">
               <a:rPr lang="ru-RU" smtClean="0"/>
-              <a:t>23.10.2020</a:t>
+              <a:t>01.11.2020</a:t>
             </a:fld>
             <a:endParaRPr lang="ru-RU"/>
           </a:p>
@@ -1383,7 +1383,7 @@
           <a:p>
             <a:fld id="{817AFE9C-9D88-408D-88B4-E7A081487440}" type="datetimeFigureOut">
               <a:rPr lang="ru-RU" smtClean="0"/>
-              <a:t>23.10.2020</a:t>
+              <a:t>01.11.2020</a:t>
             </a:fld>
             <a:endParaRPr lang="ru-RU"/>
           </a:p>
@@ -1563,7 +1563,7 @@
           <a:p>
             <a:fld id="{817AFE9C-9D88-408D-88B4-E7A081487440}" type="datetimeFigureOut">
               <a:rPr lang="ru-RU" smtClean="0"/>
-              <a:t>23.10.2020</a:t>
+              <a:t>01.11.2020</a:t>
             </a:fld>
             <a:endParaRPr lang="ru-RU"/>
           </a:p>
@@ -1733,7 +1733,7 @@
           <a:p>
             <a:fld id="{817AFE9C-9D88-408D-88B4-E7A081487440}" type="datetimeFigureOut">
               <a:rPr lang="ru-RU" smtClean="0"/>
-              <a:t>23.10.2020</a:t>
+              <a:t>01.11.2020</a:t>
             </a:fld>
             <a:endParaRPr lang="ru-RU"/>
           </a:p>
@@ -1979,7 +1979,7 @@
           <a:p>
             <a:fld id="{817AFE9C-9D88-408D-88B4-E7A081487440}" type="datetimeFigureOut">
               <a:rPr lang="ru-RU" smtClean="0"/>
-              <a:t>23.10.2020</a:t>
+              <a:t>01.11.2020</a:t>
             </a:fld>
             <a:endParaRPr lang="ru-RU"/>
           </a:p>
@@ -2211,7 +2211,7 @@
           <a:p>
             <a:fld id="{817AFE9C-9D88-408D-88B4-E7A081487440}" type="datetimeFigureOut">
               <a:rPr lang="ru-RU" smtClean="0"/>
-              <a:t>23.10.2020</a:t>
+              <a:t>01.11.2020</a:t>
             </a:fld>
             <a:endParaRPr lang="ru-RU"/>
           </a:p>
@@ -2578,7 +2578,7 @@
           <a:p>
             <a:fld id="{817AFE9C-9D88-408D-88B4-E7A081487440}" type="datetimeFigureOut">
               <a:rPr lang="ru-RU" smtClean="0"/>
-              <a:t>23.10.2020</a:t>
+              <a:t>01.11.2020</a:t>
             </a:fld>
             <a:endParaRPr lang="ru-RU"/>
           </a:p>
@@ -2696,7 +2696,7 @@
           <a:p>
             <a:fld id="{817AFE9C-9D88-408D-88B4-E7A081487440}" type="datetimeFigureOut">
               <a:rPr lang="ru-RU" smtClean="0"/>
-              <a:t>23.10.2020</a:t>
+              <a:t>01.11.2020</a:t>
             </a:fld>
             <a:endParaRPr lang="ru-RU"/>
           </a:p>
@@ -2791,7 +2791,7 @@
           <a:p>
             <a:fld id="{817AFE9C-9D88-408D-88B4-E7A081487440}" type="datetimeFigureOut">
               <a:rPr lang="ru-RU" smtClean="0"/>
-              <a:t>23.10.2020</a:t>
+              <a:t>01.11.2020</a:t>
             </a:fld>
             <a:endParaRPr lang="ru-RU"/>
           </a:p>
@@ -3068,7 +3068,7 @@
           <a:p>
             <a:fld id="{817AFE9C-9D88-408D-88B4-E7A081487440}" type="datetimeFigureOut">
               <a:rPr lang="ru-RU" smtClean="0"/>
-              <a:t>23.10.2020</a:t>
+              <a:t>01.11.2020</a:t>
             </a:fld>
             <a:endParaRPr lang="ru-RU"/>
           </a:p>
@@ -3321,7 +3321,7 @@
           <a:p>
             <a:fld id="{817AFE9C-9D88-408D-88B4-E7A081487440}" type="datetimeFigureOut">
               <a:rPr lang="ru-RU" smtClean="0"/>
-              <a:t>23.10.2020</a:t>
+              <a:t>01.11.2020</a:t>
             </a:fld>
             <a:endParaRPr lang="ru-RU"/>
           </a:p>
@@ -3534,7 +3534,7 @@
           <a:p>
             <a:fld id="{817AFE9C-9D88-408D-88B4-E7A081487440}" type="datetimeFigureOut">
               <a:rPr lang="ru-RU" smtClean="0"/>
-              <a:t>23.10.2020</a:t>
+              <a:t>01.11.2020</a:t>
             </a:fld>
             <a:endParaRPr lang="ru-RU"/>
           </a:p>
@@ -8034,15 +8034,6 @@
               </a:rPr>
               <a:t>источника тепла.</a:t>
             </a:r>
-            <a:endParaRPr lang="ru-RU" dirty="0">
-              <a:solidFill>
-                <a:schemeClr val="accent2">
-                  <a:lumMod val="75000"/>
-                </a:schemeClr>
-              </a:solidFill>
-              <a:latin typeface="Times New Roman" panose="02020603050405020304" pitchFamily="18" charset="0"/>
-              <a:cs typeface="Times New Roman" panose="02020603050405020304" pitchFamily="18" charset="0"/>
-            </a:endParaRPr>
           </a:p>
         </p:txBody>
       </p:sp>
@@ -9288,44 +9279,48 @@
         </p:nvSpPr>
         <p:spPr>
           <a:xfrm>
-            <a:off x="3022833" y="2305953"/>
-            <a:ext cx="6096000" cy="618631"/>
+            <a:off x="1563148" y="368098"/>
+            <a:ext cx="8730143" cy="794064"/>
           </a:xfrm>
           <a:prstGeom prst="rect">
             <a:avLst/>
           </a:prstGeom>
         </p:spPr>
         <p:txBody>
-          <a:bodyPr>
+          <a:bodyPr wrap="square">
             <a:spAutoFit/>
           </a:bodyPr>
           <a:lstStyle/>
           <a:p>
-            <a:pPr marL="342900" indent="-342900">
+            <a:pPr algn="ctr">
               <a:lnSpc>
                 <a:spcPct val="95000"/>
               </a:lnSpc>
               <a:spcAft>
                 <a:spcPts val="600"/>
               </a:spcAft>
-              <a:buFont typeface="+mj-lt"/>
-              <a:buAutoNum type="arabicPeriod"/>
               <a:tabLst>
                 <a:tab pos="182880" algn="l"/>
               </a:tabLst>
             </a:pPr>
             <a:r>
-              <a:rPr lang="ru-RU" dirty="0">
-                <a:solidFill>
-                  <a:schemeClr val="accent2">
-                    <a:lumMod val="75000"/>
-                  </a:schemeClr>
-                </a:solidFill>
-                <a:latin typeface="Times New Roman" panose="02020603050405020304" pitchFamily="18" charset="0"/>
-                <a:cs typeface="Times New Roman" panose="02020603050405020304" pitchFamily="18" charset="0"/>
-              </a:rPr>
-              <a:t>Проверка на чувствительность (реагирования) системы к управляющему воздействию (разомкнуть систему).</a:t>
-            </a:r>
+              <a:rPr lang="ru-RU" sz="2400" b="1" dirty="0">
+                <a:latin typeface="Times New Roman" panose="02020603050405020304" pitchFamily="18" charset="0"/>
+                <a:cs typeface="Times New Roman" panose="02020603050405020304" pitchFamily="18" charset="0"/>
+              </a:rPr>
+              <a:t>Проверка на чувствительность (реагирования) системы к управляющему воздействию (разомкнуть систему</a:t>
+            </a:r>
+            <a:r>
+              <a:rPr lang="ru-RU" sz="2400" b="1" dirty="0" smtClean="0">
+                <a:latin typeface="Times New Roman" panose="02020603050405020304" pitchFamily="18" charset="0"/>
+                <a:cs typeface="Times New Roman" panose="02020603050405020304" pitchFamily="18" charset="0"/>
+              </a:rPr>
+              <a:t>)</a:t>
+            </a:r>
+            <a:endParaRPr lang="ru-RU" sz="2400" b="1" dirty="0">
+              <a:latin typeface="Times New Roman" panose="02020603050405020304" pitchFamily="18" charset="0"/>
+              <a:cs typeface="Times New Roman" panose="02020603050405020304" pitchFamily="18" charset="0"/>
+            </a:endParaRPr>
           </a:p>
         </p:txBody>
       </p:sp>
@@ -9368,7 +9363,7 @@
         <p:spPr>
           <a:xfrm>
             <a:off x="0" y="732331"/>
-            <a:ext cx="5805996" cy="3345531"/>
+            <a:ext cx="5805996" cy="1163395"/>
           </a:xfrm>
           <a:prstGeom prst="rect">
             <a:avLst/>
@@ -9440,103 +9435,7 @@
                 <a:latin typeface="Times New Roman" panose="02020603050405020304" pitchFamily="18" charset="0"/>
                 <a:cs typeface="Times New Roman" panose="02020603050405020304" pitchFamily="18" charset="0"/>
               </a:rPr>
-              <a:t>Кстати, получается, что в испарителе у нас должно быть не просто 4 пространственные точки для 6 уравнений, а 4 пространственные точки для 4 уравнений (</a:t>
-            </a:r>
-            <a:r>
-              <a:rPr lang="ru-RU" dirty="0" err="1" smtClean="0">
-                <a:solidFill>
-                  <a:schemeClr val="accent2">
-                    <a:lumMod val="75000"/>
-                  </a:schemeClr>
-                </a:solidFill>
-                <a:latin typeface="Times New Roman" panose="02020603050405020304" pitchFamily="18" charset="0"/>
-                <a:cs typeface="Times New Roman" panose="02020603050405020304" pitchFamily="18" charset="0"/>
-              </a:rPr>
-              <a:t>Сжид</a:t>
-            </a:r>
-            <a:r>
-              <a:rPr lang="ru-RU" dirty="0" smtClean="0">
-                <a:solidFill>
-                  <a:schemeClr val="accent2">
-                    <a:lumMod val="75000"/>
-                  </a:schemeClr>
-                </a:solidFill>
-                <a:latin typeface="Times New Roman" panose="02020603050405020304" pitchFamily="18" charset="0"/>
-                <a:cs typeface="Times New Roman" panose="02020603050405020304" pitchFamily="18" charset="0"/>
-              </a:rPr>
-              <a:t>, </a:t>
-            </a:r>
-            <a:r>
-              <a:rPr lang="ru-RU" dirty="0" err="1" smtClean="0">
-                <a:solidFill>
-                  <a:schemeClr val="accent2">
-                    <a:lumMod val="75000"/>
-                  </a:schemeClr>
-                </a:solidFill>
-                <a:latin typeface="Times New Roman" panose="02020603050405020304" pitchFamily="18" charset="0"/>
-                <a:cs typeface="Times New Roman" panose="02020603050405020304" pitchFamily="18" charset="0"/>
-              </a:rPr>
-              <a:t>Тжид</a:t>
-            </a:r>
-            <a:r>
-              <a:rPr lang="ru-RU" dirty="0" smtClean="0">
-                <a:solidFill>
-                  <a:schemeClr val="accent2">
-                    <a:lumMod val="75000"/>
-                  </a:schemeClr>
-                </a:solidFill>
-                <a:latin typeface="Times New Roman" panose="02020603050405020304" pitchFamily="18" charset="0"/>
-                <a:cs typeface="Times New Roman" panose="02020603050405020304" pitchFamily="18" charset="0"/>
-              </a:rPr>
-              <a:t>, </a:t>
-            </a:r>
-            <a:r>
-              <a:rPr lang="ru-RU" dirty="0" err="1" smtClean="0">
-                <a:solidFill>
-                  <a:schemeClr val="accent2">
-                    <a:lumMod val="75000"/>
-                  </a:schemeClr>
-                </a:solidFill>
-                <a:latin typeface="Times New Roman" panose="02020603050405020304" pitchFamily="18" charset="0"/>
-                <a:cs typeface="Times New Roman" panose="02020603050405020304" pitchFamily="18" charset="0"/>
-              </a:rPr>
-              <a:t>Тст</a:t>
-            </a:r>
-            <a:r>
-              <a:rPr lang="ru-RU" dirty="0" smtClean="0">
-                <a:solidFill>
-                  <a:schemeClr val="accent2">
-                    <a:lumMod val="75000"/>
-                  </a:schemeClr>
-                </a:solidFill>
-                <a:latin typeface="Times New Roman" panose="02020603050405020304" pitchFamily="18" charset="0"/>
-                <a:cs typeface="Times New Roman" panose="02020603050405020304" pitchFamily="18" charset="0"/>
-              </a:rPr>
-              <a:t>, </a:t>
-            </a:r>
-            <a:r>
-              <a:rPr lang="ru-RU" dirty="0" err="1" smtClean="0">
-                <a:solidFill>
-                  <a:schemeClr val="accent2">
-                    <a:lumMod val="75000"/>
-                  </a:schemeClr>
-                </a:solidFill>
-                <a:latin typeface="Times New Roman" panose="02020603050405020304" pitchFamily="18" charset="0"/>
-                <a:cs typeface="Times New Roman" panose="02020603050405020304" pitchFamily="18" charset="0"/>
-              </a:rPr>
-              <a:t>Тдг</a:t>
-            </a:r>
-            <a:r>
-              <a:rPr lang="ru-RU" dirty="0" smtClean="0">
-                <a:solidFill>
-                  <a:schemeClr val="accent2">
-                    <a:lumMod val="75000"/>
-                  </a:schemeClr>
-                </a:solidFill>
-                <a:latin typeface="Times New Roman" panose="02020603050405020304" pitchFamily="18" charset="0"/>
-                <a:cs typeface="Times New Roman" panose="02020603050405020304" pitchFamily="18" charset="0"/>
-              </a:rPr>
-              <a:t>) и 2 </a:t>
+              <a:t>Может </a:t>
             </a:r>
             <a:r>
               <a:rPr lang="ru-RU" dirty="0">
@@ -9548,130 +9447,7 @@
                 <a:latin typeface="Times New Roman" panose="02020603050405020304" pitchFamily="18" charset="0"/>
                 <a:cs typeface="Times New Roman" panose="02020603050405020304" pitchFamily="18" charset="0"/>
               </a:rPr>
-              <a:t>пространственные точки для </a:t>
-            </a:r>
-            <a:r>
-              <a:rPr lang="ru-RU" dirty="0" smtClean="0">
-                <a:solidFill>
-                  <a:schemeClr val="accent2">
-                    <a:lumMod val="75000"/>
-                  </a:schemeClr>
-                </a:solidFill>
-                <a:latin typeface="Times New Roman" panose="02020603050405020304" pitchFamily="18" charset="0"/>
-                <a:cs typeface="Times New Roman" panose="02020603050405020304" pitchFamily="18" charset="0"/>
-              </a:rPr>
-              <a:t>2 </a:t>
-            </a:r>
-            <a:r>
-              <a:rPr lang="ru-RU" dirty="0">
-                <a:solidFill>
-                  <a:schemeClr val="accent2">
-                    <a:lumMod val="75000"/>
-                  </a:schemeClr>
-                </a:solidFill>
-                <a:latin typeface="Times New Roman" panose="02020603050405020304" pitchFamily="18" charset="0"/>
-                <a:cs typeface="Times New Roman" panose="02020603050405020304" pitchFamily="18" charset="0"/>
-              </a:rPr>
-              <a:t>уравнений (</a:t>
-            </a:r>
-            <a:r>
-              <a:rPr lang="ru-RU" dirty="0" err="1" smtClean="0">
-                <a:solidFill>
-                  <a:schemeClr val="accent2">
-                    <a:lumMod val="75000"/>
-                  </a:schemeClr>
-                </a:solidFill>
-                <a:latin typeface="Times New Roman" panose="02020603050405020304" pitchFamily="18" charset="0"/>
-                <a:cs typeface="Times New Roman" panose="02020603050405020304" pitchFamily="18" charset="0"/>
-              </a:rPr>
-              <a:t>Спар</a:t>
-            </a:r>
-            <a:r>
-              <a:rPr lang="ru-RU" dirty="0" smtClean="0">
-                <a:solidFill>
-                  <a:schemeClr val="accent2">
-                    <a:lumMod val="75000"/>
-                  </a:schemeClr>
-                </a:solidFill>
-                <a:latin typeface="Times New Roman" panose="02020603050405020304" pitchFamily="18" charset="0"/>
-                <a:cs typeface="Times New Roman" panose="02020603050405020304" pitchFamily="18" charset="0"/>
-              </a:rPr>
-              <a:t>, </a:t>
-            </a:r>
-            <a:r>
-              <a:rPr lang="ru-RU" dirty="0" err="1" smtClean="0">
-                <a:solidFill>
-                  <a:schemeClr val="accent2">
-                    <a:lumMod val="75000"/>
-                  </a:schemeClr>
-                </a:solidFill>
-                <a:latin typeface="Times New Roman" panose="02020603050405020304" pitchFamily="18" charset="0"/>
-                <a:cs typeface="Times New Roman" panose="02020603050405020304" pitchFamily="18" charset="0"/>
-              </a:rPr>
-              <a:t>Тпар</a:t>
-            </a:r>
-            <a:r>
-              <a:rPr lang="ru-RU" dirty="0" smtClean="0">
-                <a:solidFill>
-                  <a:schemeClr val="accent2">
-                    <a:lumMod val="75000"/>
-                  </a:schemeClr>
-                </a:solidFill>
-                <a:latin typeface="Times New Roman" panose="02020603050405020304" pitchFamily="18" charset="0"/>
-                <a:cs typeface="Times New Roman" panose="02020603050405020304" pitchFamily="18" charset="0"/>
-              </a:rPr>
-              <a:t>), находящиеся чуть выше (это сколько? и надо ли это учитывать? и где?) уровня жидкости, в </a:t>
-            </a:r>
-            <a:r>
-              <a:rPr lang="ru-RU" dirty="0" err="1" smtClean="0">
-                <a:solidFill>
-                  <a:schemeClr val="accent2">
-                    <a:lumMod val="75000"/>
-                  </a:schemeClr>
-                </a:solidFill>
-                <a:latin typeface="Times New Roman" panose="02020603050405020304" pitchFamily="18" charset="0"/>
-                <a:cs typeface="Times New Roman" panose="02020603050405020304" pitchFamily="18" charset="0"/>
-              </a:rPr>
-              <a:t>эвопорциальном</a:t>
-            </a:r>
-            <a:r>
-              <a:rPr lang="ru-RU" dirty="0" smtClean="0">
-                <a:solidFill>
-                  <a:schemeClr val="accent2">
-                    <a:lumMod val="75000"/>
-                  </a:schemeClr>
-                </a:solidFill>
-                <a:latin typeface="Times New Roman" panose="02020603050405020304" pitchFamily="18" charset="0"/>
-                <a:cs typeface="Times New Roman" panose="02020603050405020304" pitchFamily="18" charset="0"/>
-              </a:rPr>
-              <a:t> пространстве.</a:t>
-            </a:r>
-          </a:p>
-          <a:p>
-            <a:pPr marL="514350" indent="-514350">
-              <a:lnSpc>
-                <a:spcPct val="95000"/>
-              </a:lnSpc>
-              <a:spcAft>
-                <a:spcPts val="600"/>
-              </a:spcAft>
-              <a:buFont typeface="+mj-lt"/>
-              <a:buAutoNum type="arabicPeriod"/>
-              <a:tabLst>
-                <a:tab pos="182880" algn="l"/>
-              </a:tabLst>
-            </a:pPr>
-            <a:r>
-              <a:rPr lang="ru-RU" dirty="0">
-                <a:solidFill>
-                  <a:schemeClr val="accent2">
-                    <a:lumMod val="75000"/>
-                  </a:schemeClr>
-                </a:solidFill>
-                <a:latin typeface="Times New Roman" panose="02020603050405020304" pitchFamily="18" charset="0"/>
-                <a:cs typeface="Times New Roman" panose="02020603050405020304" pitchFamily="18" charset="0"/>
-              </a:rPr>
-              <a:t>Может использовать законы адаптации именно для ПОДСТРОЙКИ </a:t>
+              <a:t>использовать законы адаптации именно для ПОДСТРОЙКИ </a:t>
             </a:r>
             <a:r>
               <a:rPr lang="ru-RU" dirty="0" err="1">

</xml_diff>

<commit_message>
Added new matlab model
</commit_message>
<xml_diff>
--- a/0_Docs_dir/3_General/Отчёт руководителям.pptx
+++ b/0_Docs_dir/3_General/Отчёт руководителям.pptx
@@ -5,7 +5,7 @@
     <p:sldMasterId id="2147483648" r:id="rId1"/>
   </p:sldMasterIdLst>
   <p:notesMasterIdLst>
-    <p:notesMasterId r:id="rId26"/>
+    <p:notesMasterId r:id="rId25"/>
   </p:notesMasterIdLst>
   <p:sldIdLst>
     <p:sldId id="256" r:id="rId2"/>
@@ -29,9 +29,8 @@
     <p:sldId id="288" r:id="rId20"/>
     <p:sldId id="289" r:id="rId21"/>
     <p:sldId id="290" r:id="rId22"/>
-    <p:sldId id="291" r:id="rId23"/>
-    <p:sldId id="268" r:id="rId24"/>
-    <p:sldId id="282" r:id="rId25"/>
+    <p:sldId id="268" r:id="rId23"/>
+    <p:sldId id="282" r:id="rId24"/>
   </p:sldIdLst>
   <p:sldSz cx="12192000" cy="6858000"/>
   <p:notesSz cx="6858000" cy="9144000"/>
@@ -220,7 +219,7 @@
           <a:p>
             <a:fld id="{E08BA5C7-0DF6-4BB3-8D80-C09E800CF8CB}" type="datetimeFigureOut">
               <a:rPr lang="ru-RU" smtClean="0"/>
-              <a:t>01.11.2020</a:t>
+              <a:t>15.11.2020</a:t>
             </a:fld>
             <a:endParaRPr lang="ru-RU"/>
           </a:p>
@@ -976,7 +975,7 @@
           <a:p>
             <a:fld id="{A2425CCF-BF91-44B3-BCB8-30DCB1C53B10}" type="slidenum">
               <a:rPr lang="ru-RU" smtClean="0"/>
-              <a:t>23</a:t>
+              <a:t>22</a:t>
             </a:fld>
             <a:endParaRPr lang="ru-RU"/>
           </a:p>
@@ -1063,7 +1062,7 @@
           <a:p>
             <a:fld id="{A2425CCF-BF91-44B3-BCB8-30DCB1C53B10}" type="slidenum">
               <a:rPr lang="ru-RU" smtClean="0"/>
-              <a:t>24</a:t>
+              <a:t>23</a:t>
             </a:fld>
             <a:endParaRPr lang="ru-RU"/>
           </a:p>
@@ -1213,7 +1212,7 @@
           <a:p>
             <a:fld id="{817AFE9C-9D88-408D-88B4-E7A081487440}" type="datetimeFigureOut">
               <a:rPr lang="ru-RU" smtClean="0"/>
-              <a:t>01.11.2020</a:t>
+              <a:t>15.11.2020</a:t>
             </a:fld>
             <a:endParaRPr lang="ru-RU"/>
           </a:p>
@@ -1383,7 +1382,7 @@
           <a:p>
             <a:fld id="{817AFE9C-9D88-408D-88B4-E7A081487440}" type="datetimeFigureOut">
               <a:rPr lang="ru-RU" smtClean="0"/>
-              <a:t>01.11.2020</a:t>
+              <a:t>15.11.2020</a:t>
             </a:fld>
             <a:endParaRPr lang="ru-RU"/>
           </a:p>
@@ -1563,7 +1562,7 @@
           <a:p>
             <a:fld id="{817AFE9C-9D88-408D-88B4-E7A081487440}" type="datetimeFigureOut">
               <a:rPr lang="ru-RU" smtClean="0"/>
-              <a:t>01.11.2020</a:t>
+              <a:t>15.11.2020</a:t>
             </a:fld>
             <a:endParaRPr lang="ru-RU"/>
           </a:p>
@@ -1733,7 +1732,7 @@
           <a:p>
             <a:fld id="{817AFE9C-9D88-408D-88B4-E7A081487440}" type="datetimeFigureOut">
               <a:rPr lang="ru-RU" smtClean="0"/>
-              <a:t>01.11.2020</a:t>
+              <a:t>15.11.2020</a:t>
             </a:fld>
             <a:endParaRPr lang="ru-RU"/>
           </a:p>
@@ -1979,7 +1978,7 @@
           <a:p>
             <a:fld id="{817AFE9C-9D88-408D-88B4-E7A081487440}" type="datetimeFigureOut">
               <a:rPr lang="ru-RU" smtClean="0"/>
-              <a:t>01.11.2020</a:t>
+              <a:t>15.11.2020</a:t>
             </a:fld>
             <a:endParaRPr lang="ru-RU"/>
           </a:p>
@@ -2211,7 +2210,7 @@
           <a:p>
             <a:fld id="{817AFE9C-9D88-408D-88B4-E7A081487440}" type="datetimeFigureOut">
               <a:rPr lang="ru-RU" smtClean="0"/>
-              <a:t>01.11.2020</a:t>
+              <a:t>15.11.2020</a:t>
             </a:fld>
             <a:endParaRPr lang="ru-RU"/>
           </a:p>
@@ -2578,7 +2577,7 @@
           <a:p>
             <a:fld id="{817AFE9C-9D88-408D-88B4-E7A081487440}" type="datetimeFigureOut">
               <a:rPr lang="ru-RU" smtClean="0"/>
-              <a:t>01.11.2020</a:t>
+              <a:t>15.11.2020</a:t>
             </a:fld>
             <a:endParaRPr lang="ru-RU"/>
           </a:p>
@@ -2696,7 +2695,7 @@
           <a:p>
             <a:fld id="{817AFE9C-9D88-408D-88B4-E7A081487440}" type="datetimeFigureOut">
               <a:rPr lang="ru-RU" smtClean="0"/>
-              <a:t>01.11.2020</a:t>
+              <a:t>15.11.2020</a:t>
             </a:fld>
             <a:endParaRPr lang="ru-RU"/>
           </a:p>
@@ -2791,7 +2790,7 @@
           <a:p>
             <a:fld id="{817AFE9C-9D88-408D-88B4-E7A081487440}" type="datetimeFigureOut">
               <a:rPr lang="ru-RU" smtClean="0"/>
-              <a:t>01.11.2020</a:t>
+              <a:t>15.11.2020</a:t>
             </a:fld>
             <a:endParaRPr lang="ru-RU"/>
           </a:p>
@@ -3068,7 +3067,7 @@
           <a:p>
             <a:fld id="{817AFE9C-9D88-408D-88B4-E7A081487440}" type="datetimeFigureOut">
               <a:rPr lang="ru-RU" smtClean="0"/>
-              <a:t>01.11.2020</a:t>
+              <a:t>15.11.2020</a:t>
             </a:fld>
             <a:endParaRPr lang="ru-RU"/>
           </a:p>
@@ -3321,7 +3320,7 @@
           <a:p>
             <a:fld id="{817AFE9C-9D88-408D-88B4-E7A081487440}" type="datetimeFigureOut">
               <a:rPr lang="ru-RU" smtClean="0"/>
-              <a:t>01.11.2020</a:t>
+              <a:t>15.11.2020</a:t>
             </a:fld>
             <a:endParaRPr lang="ru-RU"/>
           </a:p>
@@ -3534,7 +3533,7 @@
           <a:p>
             <a:fld id="{817AFE9C-9D88-408D-88B4-E7A081487440}" type="datetimeFigureOut">
               <a:rPr lang="ru-RU" smtClean="0"/>
-              <a:t>01.11.2020</a:t>
+              <a:t>15.11.2020</a:t>
             </a:fld>
             <a:endParaRPr lang="ru-RU"/>
           </a:p>
@@ -8067,6 +8066,66 @@
           <a:chExt cx="0" cy="0"/>
         </a:xfrm>
       </p:grpSpPr>
+      <p:pic>
+        <p:nvPicPr>
+          <p:cNvPr id="2" name="Рисунок 1"/>
+          <p:cNvPicPr>
+            <a:picLocks noChangeAspect="1"/>
+          </p:cNvPicPr>
+          <p:nvPr/>
+        </p:nvPicPr>
+        <p:blipFill>
+          <a:blip r:embed="rId2">
+            <a:extLst>
+              <a:ext uri="{28A0092B-C50C-407E-A947-70E740481C1C}">
+                <a14:useLocalDpi xmlns:a14="http://schemas.microsoft.com/office/drawing/2010/main" val="0"/>
+              </a:ext>
+            </a:extLst>
+          </a:blip>
+          <a:stretch>
+            <a:fillRect/>
+          </a:stretch>
+        </p:blipFill>
+        <p:spPr>
+          <a:xfrm>
+            <a:off x="1642116" y="0"/>
+            <a:ext cx="4638782" cy="6858000"/>
+          </a:xfrm>
+          <a:prstGeom prst="rect">
+            <a:avLst/>
+          </a:prstGeom>
+        </p:spPr>
+      </p:pic>
+      <p:pic>
+        <p:nvPicPr>
+          <p:cNvPr id="3" name="Рисунок 2"/>
+          <p:cNvPicPr>
+            <a:picLocks noChangeAspect="1"/>
+          </p:cNvPicPr>
+          <p:nvPr/>
+        </p:nvPicPr>
+        <p:blipFill>
+          <a:blip r:embed="rId3">
+            <a:extLst>
+              <a:ext uri="{28A0092B-C50C-407E-A947-70E740481C1C}">
+                <a14:useLocalDpi xmlns:a14="http://schemas.microsoft.com/office/drawing/2010/main" val="0"/>
+              </a:ext>
+            </a:extLst>
+          </a:blip>
+          <a:stretch>
+            <a:fillRect/>
+          </a:stretch>
+        </p:blipFill>
+        <p:spPr>
+          <a:xfrm>
+            <a:off x="6280898" y="0"/>
+            <a:ext cx="5958718" cy="6858000"/>
+          </a:xfrm>
+          <a:prstGeom prst="rect">
+            <a:avLst/>
+          </a:prstGeom>
+        </p:spPr>
+      </p:pic>
       <p:sp>
         <p:nvSpPr>
           <p:cNvPr id="5" name="Прямоугольник 4"/>
@@ -8075,8 +8134,8 @@
         </p:nvSpPr>
         <p:spPr>
           <a:xfrm>
-            <a:off x="839469" y="1203775"/>
-            <a:ext cx="11132598" cy="2040559"/>
+            <a:off x="-108487" y="2462123"/>
+            <a:ext cx="1987621" cy="2819233"/>
           </a:xfrm>
           <a:prstGeom prst="rect">
             <a:avLst/>
@@ -8100,12 +8159,77 @@
               </a:tabLst>
             </a:pPr>
             <a:r>
-              <a:rPr lang="ru-RU" sz="3200" dirty="0" smtClean="0">
-                <a:latin typeface="Times New Roman" panose="02020603050405020304" pitchFamily="18" charset="0"/>
-                <a:cs typeface="Times New Roman" panose="02020603050405020304" pitchFamily="18" charset="0"/>
-              </a:rPr>
-              <a:t>Компенсация параметрической неопределённости (внутреннее изменение рабочего давления и изменение атмосферного давления)</a:t>
-            </a:r>
+              <a:rPr lang="ru-RU" sz="1600" dirty="0" smtClean="0">
+                <a:latin typeface="Times New Roman" panose="02020603050405020304" pitchFamily="18" charset="0"/>
+                <a:cs typeface="Times New Roman" panose="02020603050405020304" pitchFamily="18" charset="0"/>
+              </a:rPr>
+              <a:t>Компенсация параметрической неопределённости </a:t>
+            </a:r>
+            <a:r>
+              <a:rPr lang="en-US" sz="1600" dirty="0" smtClean="0">
+                <a:latin typeface="Times New Roman" panose="02020603050405020304" pitchFamily="18" charset="0"/>
+                <a:cs typeface="Times New Roman" panose="02020603050405020304" pitchFamily="18" charset="0"/>
+              </a:rPr>
+              <a:t/>
+            </a:r>
+            <a:br>
+              <a:rPr lang="en-US" sz="1600" dirty="0" smtClean="0">
+                <a:latin typeface="Times New Roman" panose="02020603050405020304" pitchFamily="18" charset="0"/>
+                <a:cs typeface="Times New Roman" panose="02020603050405020304" pitchFamily="18" charset="0"/>
+              </a:rPr>
+            </a:br>
+            <a:r>
+              <a:rPr lang="en-US" sz="1600" dirty="0" smtClean="0">
+                <a:latin typeface="Times New Roman" panose="02020603050405020304" pitchFamily="18" charset="0"/>
+                <a:cs typeface="Times New Roman" panose="02020603050405020304" pitchFamily="18" charset="0"/>
+              </a:rPr>
+              <a:t/>
+            </a:r>
+            <a:br>
+              <a:rPr lang="en-US" sz="1600" dirty="0" smtClean="0">
+                <a:latin typeface="Times New Roman" panose="02020603050405020304" pitchFamily="18" charset="0"/>
+                <a:cs typeface="Times New Roman" panose="02020603050405020304" pitchFamily="18" charset="0"/>
+              </a:rPr>
+            </a:br>
+            <a:r>
+              <a:rPr lang="ru-RU" sz="1600" dirty="0" smtClean="0">
+                <a:latin typeface="Times New Roman" panose="02020603050405020304" pitchFamily="18" charset="0"/>
+                <a:cs typeface="Times New Roman" panose="02020603050405020304" pitchFamily="18" charset="0"/>
+              </a:rPr>
+              <a:t>(</a:t>
+            </a:r>
+            <a:r>
+              <a:rPr lang="ru-RU" sz="1600" dirty="0" smtClean="0">
+                <a:latin typeface="Times New Roman" panose="02020603050405020304" pitchFamily="18" charset="0"/>
+                <a:cs typeface="Times New Roman" panose="02020603050405020304" pitchFamily="18" charset="0"/>
+              </a:rPr>
+              <a:t>внутреннее изменение </a:t>
+            </a:r>
+            <a:r>
+              <a:rPr lang="ru-RU" sz="1600" dirty="0" smtClean="0">
+                <a:latin typeface="Times New Roman" panose="02020603050405020304" pitchFamily="18" charset="0"/>
+                <a:cs typeface="Times New Roman" panose="02020603050405020304" pitchFamily="18" charset="0"/>
+              </a:rPr>
+              <a:t>атмосферного </a:t>
+            </a:r>
+            <a:r>
+              <a:rPr lang="ru-RU" sz="1600" dirty="0" smtClean="0">
+                <a:latin typeface="Times New Roman" panose="02020603050405020304" pitchFamily="18" charset="0"/>
+                <a:cs typeface="Times New Roman" panose="02020603050405020304" pitchFamily="18" charset="0"/>
+              </a:rPr>
+              <a:t>давления</a:t>
+            </a:r>
+            <a:r>
+              <a:rPr lang="ru-RU" sz="1600" dirty="0" smtClean="0">
+                <a:latin typeface="Times New Roman" panose="02020603050405020304" pitchFamily="18" charset="0"/>
+                <a:cs typeface="Times New Roman" panose="02020603050405020304" pitchFamily="18" charset="0"/>
+              </a:rPr>
+              <a:t>)</a:t>
+            </a:r>
+            <a:endParaRPr lang="en-US" sz="1600" dirty="0" smtClean="0">
+              <a:latin typeface="Times New Roman" panose="02020603050405020304" pitchFamily="18" charset="0"/>
+              <a:cs typeface="Times New Roman" panose="02020603050405020304" pitchFamily="18" charset="0"/>
+            </a:endParaRPr>
           </a:p>
           <a:p>
             <a:pPr indent="182880" algn="ctr">
@@ -8119,36 +8243,11 @@
                 <a:tab pos="182880" algn="l"/>
               </a:tabLst>
             </a:pPr>
-            <a:r>
-              <a:rPr lang="ru-RU" sz="3200" dirty="0" smtClean="0">
-                <a:latin typeface="Times New Roman" panose="02020603050405020304" pitchFamily="18" charset="0"/>
-                <a:cs typeface="Times New Roman" panose="02020603050405020304" pitchFamily="18" charset="0"/>
-              </a:rPr>
-              <a:t>(работа ПИ-регулятора)</a:t>
-            </a:r>
-          </a:p>
-        </p:txBody>
-      </p:sp>
-      <p:sp>
-        <p:nvSpPr>
-          <p:cNvPr id="7" name="Прямоугольник 6"/>
-          <p:cNvSpPr/>
-          <p:nvPr/>
-        </p:nvSpPr>
-        <p:spPr>
-          <a:xfrm>
-            <a:off x="378074" y="227252"/>
-            <a:ext cx="11132598" cy="677108"/>
-          </a:xfrm>
-          <a:prstGeom prst="rect">
-            <a:avLst/>
-          </a:prstGeom>
-        </p:spPr>
-        <p:txBody>
-          <a:bodyPr wrap="square">
-            <a:spAutoFit/>
-          </a:bodyPr>
-          <a:lstStyle/>
+            <a:endParaRPr lang="ru-RU" sz="1600" dirty="0" smtClean="0">
+              <a:latin typeface="Times New Roman" panose="02020603050405020304" pitchFamily="18" charset="0"/>
+              <a:cs typeface="Times New Roman" panose="02020603050405020304" pitchFamily="18" charset="0"/>
+            </a:endParaRPr>
+          </a:p>
           <a:p>
             <a:pPr indent="182880" algn="ctr">
               <a:lnSpc>
@@ -8162,14 +8261,11 @@
               </a:tabLst>
             </a:pPr>
             <a:r>
-              <a:rPr lang="ru-RU" sz="4000" dirty="0" smtClean="0">
-                <a:solidFill>
-                  <a:schemeClr val="accent6"/>
-                </a:solidFill>
-                <a:latin typeface="Times New Roman" panose="02020603050405020304" pitchFamily="18" charset="0"/>
-                <a:cs typeface="Times New Roman" panose="02020603050405020304" pitchFamily="18" charset="0"/>
-              </a:rPr>
-              <a:t>2. Параметрическая адаптация</a:t>
+              <a:rPr lang="ru-RU" sz="1600" dirty="0" smtClean="0">
+                <a:latin typeface="Times New Roman" panose="02020603050405020304" pitchFamily="18" charset="0"/>
+                <a:cs typeface="Times New Roman" panose="02020603050405020304" pitchFamily="18" charset="0"/>
+              </a:rPr>
+              <a:t>(работа ПИ-регулятора)</a:t>
             </a:r>
           </a:p>
         </p:txBody>
@@ -8246,6 +8342,70 @@
           </a:p>
         </p:txBody>
       </p:sp>
+      <p:sp>
+        <p:nvSpPr>
+          <p:cNvPr id="2" name="TextBox 1"/>
+          <p:cNvSpPr txBox="1"/>
+          <p:nvPr/>
+        </p:nvSpPr>
+        <p:spPr>
+          <a:xfrm>
+            <a:off x="4639112" y="3431097"/>
+            <a:ext cx="184731" cy="369332"/>
+          </a:xfrm>
+          <a:prstGeom prst="rect">
+            <a:avLst/>
+          </a:prstGeom>
+          <a:noFill/>
+        </p:spPr>
+        <p:txBody>
+          <a:bodyPr wrap="none" rtlCol="0">
+            <a:spAutoFit/>
+          </a:bodyPr>
+          <a:lstStyle/>
+          <a:p>
+            <a:endParaRPr lang="ru-RU" dirty="0"/>
+          </a:p>
+        </p:txBody>
+      </p:sp>
+      <p:sp>
+        <p:nvSpPr>
+          <p:cNvPr id="3" name="TextBox 2"/>
+          <p:cNvSpPr txBox="1"/>
+          <p:nvPr/>
+        </p:nvSpPr>
+        <p:spPr>
+          <a:xfrm>
+            <a:off x="4110606" y="2994870"/>
+            <a:ext cx="4916859" cy="369332"/>
+          </a:xfrm>
+          <a:prstGeom prst="rect">
+            <a:avLst/>
+          </a:prstGeom>
+          <a:noFill/>
+        </p:spPr>
+        <p:txBody>
+          <a:bodyPr wrap="none" rtlCol="0">
+            <a:spAutoFit/>
+          </a:bodyPr>
+          <a:lstStyle/>
+          <a:p>
+            <a:r>
+              <a:rPr lang="ru-RU" dirty="0" smtClean="0"/>
+              <a:t>Только при условии изменения </a:t>
+            </a:r>
+            <a:r>
+              <a:rPr lang="ru-RU" dirty="0" err="1" smtClean="0"/>
+              <a:t>уставки</a:t>
+            </a:r>
+            <a:r>
+              <a:rPr lang="ru-RU" dirty="0" smtClean="0"/>
+              <a:t> (160 гр.)</a:t>
+            </a:r>
+            <a:endParaRPr lang="ru-RU" dirty="0"/>
+          </a:p>
+        </p:txBody>
+      </p:sp>
     </p:spTree>
     <p:extLst>
       <p:ext uri="{BB962C8B-B14F-4D97-AF65-F5344CB8AC3E}">
@@ -8318,76 +8478,6 @@
           </a:p>
         </p:txBody>
       </p:sp>
-      <p:sp>
-        <p:nvSpPr>
-          <p:cNvPr id="2" name="Прямоугольник 1"/>
-          <p:cNvSpPr/>
-          <p:nvPr/>
-        </p:nvSpPr>
-        <p:spPr>
-          <a:xfrm>
-            <a:off x="3048000" y="3119685"/>
-            <a:ext cx="6096000" cy="618631"/>
-          </a:xfrm>
-          <a:prstGeom prst="rect">
-            <a:avLst/>
-          </a:prstGeom>
-        </p:spPr>
-        <p:txBody>
-          <a:bodyPr>
-            <a:spAutoFit/>
-          </a:bodyPr>
-          <a:lstStyle/>
-          <a:p>
-            <a:pPr marL="342900" indent="-342900">
-              <a:lnSpc>
-                <a:spcPct val="95000"/>
-              </a:lnSpc>
-              <a:spcAft>
-                <a:spcPts val="600"/>
-              </a:spcAft>
-              <a:buFont typeface="+mj-lt"/>
-              <a:buAutoNum type="arabicPeriod"/>
-              <a:tabLst>
-                <a:tab pos="182880" algn="l"/>
-              </a:tabLst>
-            </a:pPr>
-            <a:r>
-              <a:rPr lang="ru-RU" dirty="0">
-                <a:solidFill>
-                  <a:schemeClr val="accent2">
-                    <a:lumMod val="75000"/>
-                  </a:schemeClr>
-                </a:solidFill>
-                <a:latin typeface="Times New Roman" panose="02020603050405020304" pitchFamily="18" charset="0"/>
-                <a:cs typeface="Times New Roman" panose="02020603050405020304" pitchFamily="18" charset="0"/>
-              </a:rPr>
-              <a:t>Ответить себе на вопрос нужен ли этой системе адаптивный </a:t>
-            </a:r>
-            <a:r>
-              <a:rPr lang="ru-RU" dirty="0" smtClean="0">
-                <a:solidFill>
-                  <a:schemeClr val="accent2">
-                    <a:lumMod val="75000"/>
-                  </a:schemeClr>
-                </a:solidFill>
-                <a:latin typeface="Times New Roman" panose="02020603050405020304" pitchFamily="18" charset="0"/>
-                <a:cs typeface="Times New Roman" panose="02020603050405020304" pitchFamily="18" charset="0"/>
-              </a:rPr>
-              <a:t>регулятор</a:t>
-            </a:r>
-            <a:endParaRPr lang="ru-RU" dirty="0">
-              <a:solidFill>
-                <a:schemeClr val="accent2">
-                  <a:lumMod val="75000"/>
-                </a:schemeClr>
-              </a:solidFill>
-              <a:latin typeface="Times New Roman" panose="02020603050405020304" pitchFamily="18" charset="0"/>
-              <a:cs typeface="Times New Roman" panose="02020603050405020304" pitchFamily="18" charset="0"/>
-            </a:endParaRPr>
-          </a:p>
-        </p:txBody>
-      </p:sp>
     </p:spTree>
     <p:extLst>
       <p:ext uri="{BB962C8B-B14F-4D97-AF65-F5344CB8AC3E}">
@@ -8418,6 +8508,66 @@
           <a:chExt cx="0" cy="0"/>
         </a:xfrm>
       </p:grpSpPr>
+      <p:pic>
+        <p:nvPicPr>
+          <p:cNvPr id="2" name="Рисунок 1"/>
+          <p:cNvPicPr>
+            <a:picLocks noChangeAspect="1"/>
+          </p:cNvPicPr>
+          <p:nvPr/>
+        </p:nvPicPr>
+        <p:blipFill>
+          <a:blip r:embed="rId2">
+            <a:extLst>
+              <a:ext uri="{28A0092B-C50C-407E-A947-70E740481C1C}">
+                <a14:useLocalDpi xmlns:a14="http://schemas.microsoft.com/office/drawing/2010/main" val="0"/>
+              </a:ext>
+            </a:extLst>
+          </a:blip>
+          <a:stretch>
+            <a:fillRect/>
+          </a:stretch>
+        </p:blipFill>
+        <p:spPr>
+          <a:xfrm>
+            <a:off x="1628605" y="0"/>
+            <a:ext cx="4531851" cy="6858000"/>
+          </a:xfrm>
+          <a:prstGeom prst="rect">
+            <a:avLst/>
+          </a:prstGeom>
+        </p:spPr>
+      </p:pic>
+      <p:pic>
+        <p:nvPicPr>
+          <p:cNvPr id="3" name="Рисунок 2"/>
+          <p:cNvPicPr>
+            <a:picLocks noChangeAspect="1"/>
+          </p:cNvPicPr>
+          <p:nvPr/>
+        </p:nvPicPr>
+        <p:blipFill>
+          <a:blip r:embed="rId3">
+            <a:extLst>
+              <a:ext uri="{28A0092B-C50C-407E-A947-70E740481C1C}">
+                <a14:useLocalDpi xmlns:a14="http://schemas.microsoft.com/office/drawing/2010/main" val="0"/>
+              </a:ext>
+            </a:extLst>
+          </a:blip>
+          <a:stretch>
+            <a:fillRect/>
+          </a:stretch>
+        </p:blipFill>
+        <p:spPr>
+          <a:xfrm>
+            <a:off x="6160456" y="0"/>
+            <a:ext cx="6031544" cy="6858000"/>
+          </a:xfrm>
+          <a:prstGeom prst="rect">
+            <a:avLst/>
+          </a:prstGeom>
+        </p:spPr>
+      </p:pic>
       <p:sp>
         <p:nvSpPr>
           <p:cNvPr id="5" name="Прямоугольник 4"/>
@@ -8426,8 +8576,8 @@
         </p:nvSpPr>
         <p:spPr>
           <a:xfrm>
-            <a:off x="839469" y="1203775"/>
-            <a:ext cx="11132598" cy="1649682"/>
+            <a:off x="0" y="2671848"/>
+            <a:ext cx="1811452" cy="1883593"/>
           </a:xfrm>
           <a:prstGeom prst="rect">
             <a:avLst/>
@@ -8451,7 +8601,7 @@
               </a:tabLst>
             </a:pPr>
             <a:r>
-              <a:rPr lang="ru-RU" sz="3200" dirty="0" smtClean="0">
+              <a:rPr lang="ru-RU" sz="1600" dirty="0" smtClean="0">
                 <a:latin typeface="Times New Roman" panose="02020603050405020304" pitchFamily="18" charset="0"/>
                 <a:cs typeface="Times New Roman" panose="02020603050405020304" pitchFamily="18" charset="0"/>
               </a:rPr>
@@ -8471,20 +8621,27 @@
               </a:tabLst>
             </a:pPr>
             <a:r>
-              <a:rPr lang="ru-RU" sz="3200" dirty="0" smtClean="0">
+              <a:rPr lang="ru-RU" sz="1600" dirty="0" smtClean="0">
                 <a:latin typeface="Times New Roman" panose="02020603050405020304" pitchFamily="18" charset="0"/>
                 <a:cs typeface="Times New Roman" panose="02020603050405020304" pitchFamily="18" charset="0"/>
               </a:rPr>
               <a:t>(скорость </a:t>
             </a:r>
             <a:r>
-              <a:rPr lang="ru-RU" sz="3200" dirty="0">
-                <a:latin typeface="Times New Roman" panose="02020603050405020304" pitchFamily="18" charset="0"/>
-                <a:cs typeface="Times New Roman" panose="02020603050405020304" pitchFamily="18" charset="0"/>
-              </a:rPr>
-              <a:t>потока жидкости исходной смеси)</a:t>
-            </a:r>
-            <a:endParaRPr lang="ru-RU" sz="3200" dirty="0" smtClean="0">
+              <a:rPr lang="ru-RU" sz="1600" dirty="0">
+                <a:latin typeface="Times New Roman" panose="02020603050405020304" pitchFamily="18" charset="0"/>
+                <a:cs typeface="Times New Roman" panose="02020603050405020304" pitchFamily="18" charset="0"/>
+              </a:rPr>
+              <a:t>потока </a:t>
+            </a:r>
+            <a:r>
+              <a:rPr lang="ru-RU" sz="1600" dirty="0" smtClean="0">
+                <a:latin typeface="Times New Roman" panose="02020603050405020304" pitchFamily="18" charset="0"/>
+                <a:cs typeface="Times New Roman" panose="02020603050405020304" pitchFamily="18" charset="0"/>
+              </a:rPr>
+              <a:t>жидкости)</a:t>
+            </a:r>
+            <a:endParaRPr lang="ru-RU" sz="1600" dirty="0">
               <a:latin typeface="Times New Roman" panose="02020603050405020304" pitchFamily="18" charset="0"/>
               <a:cs typeface="Times New Roman" panose="02020603050405020304" pitchFamily="18" charset="0"/>
             </a:endParaRPr>
@@ -8502,56 +8659,18 @@
               </a:tabLst>
             </a:pPr>
             <a:r>
-              <a:rPr lang="ru-RU" sz="3200" dirty="0" smtClean="0">
-                <a:latin typeface="Times New Roman" panose="02020603050405020304" pitchFamily="18" charset="0"/>
-                <a:cs typeface="Times New Roman" panose="02020603050405020304" pitchFamily="18" charset="0"/>
-              </a:rPr>
-              <a:t>(работа ПИ-регулятора)</a:t>
-            </a:r>
-          </a:p>
-        </p:txBody>
-      </p:sp>
-      <p:sp>
-        <p:nvSpPr>
-          <p:cNvPr id="7" name="Прямоугольник 6"/>
-          <p:cNvSpPr/>
-          <p:nvPr/>
-        </p:nvSpPr>
-        <p:spPr>
-          <a:xfrm>
-            <a:off x="378074" y="227252"/>
-            <a:ext cx="11132598" cy="677108"/>
-          </a:xfrm>
-          <a:prstGeom prst="rect">
-            <a:avLst/>
-          </a:prstGeom>
-        </p:spPr>
-        <p:txBody>
-          <a:bodyPr wrap="square">
-            <a:spAutoFit/>
-          </a:bodyPr>
-          <a:lstStyle/>
-          <a:p>
-            <a:pPr indent="182880" algn="ctr">
-              <a:lnSpc>
-                <a:spcPct val="95000"/>
-              </a:lnSpc>
-              <a:spcAft>
-                <a:spcPts val="600"/>
-              </a:spcAft>
-              <a:tabLst>
-                <a:tab pos="182880" algn="l"/>
-              </a:tabLst>
-            </a:pPr>
-            <a:r>
-              <a:rPr lang="ru-RU" sz="4000" dirty="0" smtClean="0">
-                <a:solidFill>
-                  <a:schemeClr val="accent6"/>
-                </a:solidFill>
-                <a:latin typeface="Times New Roman" panose="02020603050405020304" pitchFamily="18" charset="0"/>
-                <a:cs typeface="Times New Roman" panose="02020603050405020304" pitchFamily="18" charset="0"/>
-              </a:rPr>
-              <a:t>2. Параметрическая адаптация</a:t>
+              <a:rPr lang="ru-RU" sz="1600" dirty="0" smtClean="0">
+                <a:latin typeface="Times New Roman" panose="02020603050405020304" pitchFamily="18" charset="0"/>
+                <a:cs typeface="Times New Roman" panose="02020603050405020304" pitchFamily="18" charset="0"/>
+              </a:rPr>
+              <a:t>(</a:t>
+            </a:r>
+            <a:r>
+              <a:rPr lang="ru-RU" sz="1600" dirty="0" smtClean="0">
+                <a:latin typeface="Times New Roman" panose="02020603050405020304" pitchFamily="18" charset="0"/>
+                <a:cs typeface="Times New Roman" panose="02020603050405020304" pitchFamily="18" charset="0"/>
+              </a:rPr>
+              <a:t>работа ПИ-регулятора)</a:t>
             </a:r>
           </a:p>
         </p:txBody>
@@ -9171,76 +9290,6 @@
           </a:p>
         </p:txBody>
       </p:sp>
-      <p:sp>
-        <p:nvSpPr>
-          <p:cNvPr id="2" name="Прямоугольник 1"/>
-          <p:cNvSpPr/>
-          <p:nvPr/>
-        </p:nvSpPr>
-        <p:spPr>
-          <a:xfrm>
-            <a:off x="3048000" y="3119685"/>
-            <a:ext cx="6096000" cy="618631"/>
-          </a:xfrm>
-          <a:prstGeom prst="rect">
-            <a:avLst/>
-          </a:prstGeom>
-        </p:spPr>
-        <p:txBody>
-          <a:bodyPr>
-            <a:spAutoFit/>
-          </a:bodyPr>
-          <a:lstStyle/>
-          <a:p>
-            <a:pPr marL="342900" indent="-342900">
-              <a:lnSpc>
-                <a:spcPct val="95000"/>
-              </a:lnSpc>
-              <a:spcAft>
-                <a:spcPts val="600"/>
-              </a:spcAft>
-              <a:buFont typeface="+mj-lt"/>
-              <a:buAutoNum type="arabicPeriod"/>
-              <a:tabLst>
-                <a:tab pos="182880" algn="l"/>
-              </a:tabLst>
-            </a:pPr>
-            <a:r>
-              <a:rPr lang="ru-RU" dirty="0">
-                <a:solidFill>
-                  <a:schemeClr val="accent2">
-                    <a:lumMod val="75000"/>
-                  </a:schemeClr>
-                </a:solidFill>
-                <a:latin typeface="Times New Roman" panose="02020603050405020304" pitchFamily="18" charset="0"/>
-                <a:cs typeface="Times New Roman" panose="02020603050405020304" pitchFamily="18" charset="0"/>
-              </a:rPr>
-              <a:t>Ответить себе на вопрос нужен ли этой системе адаптивный </a:t>
-            </a:r>
-            <a:r>
-              <a:rPr lang="ru-RU" dirty="0" smtClean="0">
-                <a:solidFill>
-                  <a:schemeClr val="accent2">
-                    <a:lumMod val="75000"/>
-                  </a:schemeClr>
-                </a:solidFill>
-                <a:latin typeface="Times New Roman" panose="02020603050405020304" pitchFamily="18" charset="0"/>
-                <a:cs typeface="Times New Roman" panose="02020603050405020304" pitchFamily="18" charset="0"/>
-              </a:rPr>
-              <a:t>регулятор</a:t>
-            </a:r>
-            <a:endParaRPr lang="ru-RU" dirty="0">
-              <a:solidFill>
-                <a:schemeClr val="accent2">
-                  <a:lumMod val="75000"/>
-                </a:schemeClr>
-              </a:solidFill>
-              <a:latin typeface="Times New Roman" panose="02020603050405020304" pitchFamily="18" charset="0"/>
-              <a:cs typeface="Times New Roman" panose="02020603050405020304" pitchFamily="18" charset="0"/>
-            </a:endParaRPr>
-          </a:p>
-        </p:txBody>
-      </p:sp>
     </p:spTree>
     <p:extLst>
       <p:ext uri="{BB962C8B-B14F-4D97-AF65-F5344CB8AC3E}">
@@ -9273,89 +9322,6 @@
       </p:grpSpPr>
       <p:sp>
         <p:nvSpPr>
-          <p:cNvPr id="4" name="Прямоугольник 3"/>
-          <p:cNvSpPr/>
-          <p:nvPr/>
-        </p:nvSpPr>
-        <p:spPr>
-          <a:xfrm>
-            <a:off x="1563148" y="368098"/>
-            <a:ext cx="8730143" cy="794064"/>
-          </a:xfrm>
-          <a:prstGeom prst="rect">
-            <a:avLst/>
-          </a:prstGeom>
-        </p:spPr>
-        <p:txBody>
-          <a:bodyPr wrap="square">
-            <a:spAutoFit/>
-          </a:bodyPr>
-          <a:lstStyle/>
-          <a:p>
-            <a:pPr algn="ctr">
-              <a:lnSpc>
-                <a:spcPct val="95000"/>
-              </a:lnSpc>
-              <a:spcAft>
-                <a:spcPts val="600"/>
-              </a:spcAft>
-              <a:tabLst>
-                <a:tab pos="182880" algn="l"/>
-              </a:tabLst>
-            </a:pPr>
-            <a:r>
-              <a:rPr lang="ru-RU" sz="2400" b="1" dirty="0">
-                <a:latin typeface="Times New Roman" panose="02020603050405020304" pitchFamily="18" charset="0"/>
-                <a:cs typeface="Times New Roman" panose="02020603050405020304" pitchFamily="18" charset="0"/>
-              </a:rPr>
-              <a:t>Проверка на чувствительность (реагирования) системы к управляющему воздействию (разомкнуть систему</a:t>
-            </a:r>
-            <a:r>
-              <a:rPr lang="ru-RU" sz="2400" b="1" dirty="0" smtClean="0">
-                <a:latin typeface="Times New Roman" panose="02020603050405020304" pitchFamily="18" charset="0"/>
-                <a:cs typeface="Times New Roman" panose="02020603050405020304" pitchFamily="18" charset="0"/>
-              </a:rPr>
-              <a:t>)</a:t>
-            </a:r>
-            <a:endParaRPr lang="ru-RU" sz="2400" b="1" dirty="0">
-              <a:latin typeface="Times New Roman" panose="02020603050405020304" pitchFamily="18" charset="0"/>
-              <a:cs typeface="Times New Roman" panose="02020603050405020304" pitchFamily="18" charset="0"/>
-            </a:endParaRPr>
-          </a:p>
-        </p:txBody>
-      </p:sp>
-    </p:spTree>
-    <p:extLst>
-      <p:ext uri="{BB962C8B-B14F-4D97-AF65-F5344CB8AC3E}">
-        <p14:creationId xmlns:p14="http://schemas.microsoft.com/office/powerpoint/2010/main" val="4291853693"/>
-      </p:ext>
-    </p:extLst>
-  </p:cSld>
-  <p:clrMapOvr>
-    <a:masterClrMapping/>
-  </p:clrMapOvr>
-</p:sld>
-</file>
-
-<file path=ppt/slides/slide23.xml><?xml version="1.0" encoding="utf-8"?>
-<p:sld xmlns:a="http://schemas.openxmlformats.org/drawingml/2006/main" xmlns:r="http://schemas.openxmlformats.org/officeDocument/2006/relationships" xmlns:p="http://schemas.openxmlformats.org/presentationml/2006/main">
-  <p:cSld>
-    <p:spTree>
-      <p:nvGrpSpPr>
-        <p:cNvPr id="1" name=""/>
-        <p:cNvGrpSpPr/>
-        <p:nvPr/>
-      </p:nvGrpSpPr>
-      <p:grpSpPr>
-        <a:xfrm>
-          <a:off x="0" y="0"/>
-          <a:ext cx="0" cy="0"/>
-          <a:chOff x="0" y="0"/>
-          <a:chExt cx="0" cy="0"/>
-        </a:xfrm>
-      </p:grpSpPr>
-      <p:sp>
-        <p:nvSpPr>
           <p:cNvPr id="12" name="Прямоугольник 11"/>
           <p:cNvSpPr/>
           <p:nvPr/>
@@ -9626,7 +9592,7 @@
 </p:sld>
 </file>
 
-<file path=ppt/slides/slide24.xml><?xml version="1.0" encoding="utf-8"?>
+<file path=ppt/slides/slide23.xml><?xml version="1.0" encoding="utf-8"?>
 <p:sld xmlns:a="http://schemas.openxmlformats.org/drawingml/2006/main" xmlns:r="http://schemas.openxmlformats.org/officeDocument/2006/relationships" xmlns:p="http://schemas.openxmlformats.org/presentationml/2006/main">
   <p:cSld>
     <p:spTree>

</xml_diff>